<commit_message>
another pass on 3.3
</commit_message>
<xml_diff>
--- a/figs.pptx
+++ b/figs.pptx
@@ -104,6 +104,11 @@
       </a:defRPr>
     </a:lvl9pPr>
   </p:defaultTextStyle>
+  <p:extLst>
+    <p:ext uri="{EFAFB233-063F-42B5-8137-9DF3F51BA10A}">
+      <p15:sldGuideLst xmlns:p15="http://schemas.microsoft.com/office/powerpoint/2012/main"/>
+    </p:ext>
+  </p:extLst>
 </p:presentation>
 </file>
 
@@ -3524,7 +3529,7 @@
         </p:nvSpPr>
         <p:spPr>
           <a:xfrm>
-            <a:off x="5588130" y="2117286"/>
+            <a:off x="5578191" y="2117286"/>
             <a:ext cx="1357142" cy="364083"/>
           </a:xfrm>
           <a:prstGeom prst="ellipse">
@@ -3587,7 +3592,7 @@
         </p:nvSpPr>
         <p:spPr>
           <a:xfrm>
-            <a:off x="5480500" y="2849257"/>
+            <a:off x="5470561" y="2849257"/>
             <a:ext cx="1572402" cy="364083"/>
           </a:xfrm>
           <a:prstGeom prst="ellipse">
@@ -3650,7 +3655,7 @@
         </p:nvSpPr>
         <p:spPr>
           <a:xfrm>
-            <a:off x="4936825" y="3386958"/>
+            <a:off x="4936825" y="3436653"/>
             <a:ext cx="1149000" cy="364083"/>
           </a:xfrm>
           <a:prstGeom prst="ellipse">
@@ -3807,7 +3812,7 @@
         </p:nvCxnSpPr>
         <p:spPr>
           <a:xfrm>
-            <a:off x="5851621" y="1801588"/>
+            <a:off x="5841682" y="1801588"/>
             <a:ext cx="415080" cy="315698"/>
           </a:xfrm>
           <a:prstGeom prst="straightConnector1">
@@ -3853,7 +3858,7 @@
         </p:nvCxnSpPr>
         <p:spPr>
           <a:xfrm>
-            <a:off x="6266701" y="2481369"/>
+            <a:off x="6256762" y="2481369"/>
             <a:ext cx="0" cy="367888"/>
           </a:xfrm>
           <a:prstGeom prst="straightConnector1">
@@ -3900,7 +3905,7 @@
         <p:spPr>
           <a:xfrm>
             <a:off x="4748801" y="2764205"/>
-            <a:ext cx="356291" cy="676072"/>
+            <a:ext cx="356291" cy="725767"/>
           </a:xfrm>
           <a:prstGeom prst="straightConnector1">
             <a:avLst/>
@@ -3946,7 +3951,7 @@
         <p:spPr>
           <a:xfrm flipH="1">
             <a:off x="5917558" y="3213340"/>
-            <a:ext cx="349143" cy="226937"/>
+            <a:ext cx="339204" cy="276632"/>
           </a:xfrm>
           <a:prstGeom prst="straightConnector1">
             <a:avLst/>
@@ -3987,8 +3992,8 @@
         </p:nvSpPr>
         <p:spPr>
           <a:xfrm>
-            <a:off x="4142472" y="2079175"/>
-            <a:ext cx="737702" cy="307777"/>
+            <a:off x="3863760" y="2088169"/>
+            <a:ext cx="862737" cy="307777"/>
           </a:xfrm>
           <a:prstGeom prst="rect">
             <a:avLst/>
@@ -4003,7 +4008,7 @@
           <a:p>
             <a:r>
               <a:rPr lang="en-US" sz="1400" b="1" dirty="0"/>
-              <a:t>&lt;{s}, e&gt;</a:t>
+              <a:t>{&lt;{s}, e&gt;}</a:t>
             </a:r>
           </a:p>
         </p:txBody>
@@ -4022,8 +4027,8 @@
         </p:nvSpPr>
         <p:spPr>
           <a:xfrm>
-            <a:off x="6207209" y="1855790"/>
-            <a:ext cx="737702" cy="307777"/>
+            <a:off x="6197270" y="1855790"/>
+            <a:ext cx="862737" cy="307777"/>
           </a:xfrm>
           <a:prstGeom prst="rect">
             <a:avLst/>
@@ -4038,7 +4043,7 @@
           <a:p>
             <a:r>
               <a:rPr lang="en-US" sz="1400" b="1" dirty="0"/>
-              <a:t>&lt;{s}, e&gt;</a:t>
+              <a:t>{&lt;{s}, e&gt;}</a:t>
             </a:r>
           </a:p>
         </p:txBody>
@@ -4057,8 +4062,8 @@
         </p:nvSpPr>
         <p:spPr>
           <a:xfrm>
-            <a:off x="6266701" y="2563434"/>
-            <a:ext cx="886781" cy="307777"/>
+            <a:off x="6256762" y="2563434"/>
+            <a:ext cx="1011815" cy="307777"/>
           </a:xfrm>
           <a:prstGeom prst="rect">
             <a:avLst/>
@@ -4073,7 +4078,7 @@
           <a:p>
             <a:r>
               <a:rPr lang="en-US" sz="1400" b="1" dirty="0"/>
-              <a:t>&lt;{s, t}, e&gt;</a:t>
+              <a:t>{&lt;{s, t}, e&gt;}</a:t>
             </a:r>
           </a:p>
         </p:txBody>
@@ -4092,8 +4097,8 @@
         </p:nvSpPr>
         <p:spPr>
           <a:xfrm>
-            <a:off x="4340333" y="3233069"/>
-            <a:ext cx="652743" cy="307777"/>
+            <a:off x="5139153" y="3144503"/>
+            <a:ext cx="1306191" cy="307777"/>
           </a:xfrm>
           <a:prstGeom prst="rect">
             <a:avLst/>
@@ -4108,7 +4113,42 @@
           <a:p>
             <a:r>
               <a:rPr lang="en-US" sz="1400" b="1" dirty="0"/>
-              <a:t>&lt;∅, e&gt;</a:t>
+              <a:t>{&lt;∅, e&gt;}</a:t>
+            </a:r>
+          </a:p>
+        </p:txBody>
+      </p:sp>
+      <p:sp>
+        <p:nvSpPr>
+          <p:cNvPr id="18" name="TextBox 17">
+            <a:extLst>
+              <a:ext uri="{FF2B5EF4-FFF2-40B4-BE49-F238E27FC236}">
+                <a16:creationId xmlns:a16="http://schemas.microsoft.com/office/drawing/2014/main" id="{B5597BC6-3AE6-DA42-9C77-9E60DF36355B}"/>
+              </a:ext>
+            </a:extLst>
+          </p:cNvPr>
+          <p:cNvSpPr txBox="1"/>
+          <p:nvPr/>
+        </p:nvSpPr>
+        <p:spPr>
+          <a:xfrm>
+            <a:off x="5648471" y="1168858"/>
+            <a:ext cx="410690" cy="307777"/>
+          </a:xfrm>
+          <a:prstGeom prst="rect">
+            <a:avLst/>
+          </a:prstGeom>
+          <a:noFill/>
+        </p:spPr>
+        <p:txBody>
+          <a:bodyPr wrap="none" rtlCol="0">
+            <a:spAutoFit/>
+          </a:bodyPr>
+          <a:lstStyle/>
+          <a:p>
+            <a:r>
+              <a:rPr lang="en-US" sz="1400" b="1" dirty="0"/>
+              <a:t>∅</a:t>
             </a:r>
           </a:p>
         </p:txBody>

</xml_diff>

<commit_message>
address comments in 3.3
</commit_message>
<xml_diff>
--- a/figs.pptx
+++ b/figs.pptx
@@ -4097,7 +4097,7 @@
         </p:nvSpPr>
         <p:spPr>
           <a:xfrm>
-            <a:off x="5139153" y="3144503"/>
+            <a:off x="4273850" y="3213340"/>
             <a:ext cx="1306191" cy="307777"/>
           </a:xfrm>
           <a:prstGeom prst="rect">
@@ -4132,7 +4132,42 @@
         </p:nvSpPr>
         <p:spPr>
           <a:xfrm>
-            <a:off x="5648471" y="1168858"/>
+            <a:off x="5568959" y="1168858"/>
+            <a:ext cx="410690" cy="307777"/>
+          </a:xfrm>
+          <a:prstGeom prst="rect">
+            <a:avLst/>
+          </a:prstGeom>
+          <a:noFill/>
+        </p:spPr>
+        <p:txBody>
+          <a:bodyPr wrap="none" rtlCol="0">
+            <a:spAutoFit/>
+          </a:bodyPr>
+          <a:lstStyle/>
+          <a:p>
+            <a:r>
+              <a:rPr lang="en-US" sz="1400" b="1" dirty="0"/>
+              <a:t>∅</a:t>
+            </a:r>
+          </a:p>
+        </p:txBody>
+      </p:sp>
+      <p:sp>
+        <p:nvSpPr>
+          <p:cNvPr id="20" name="TextBox 19">
+            <a:extLst>
+              <a:ext uri="{FF2B5EF4-FFF2-40B4-BE49-F238E27FC236}">
+                <a16:creationId xmlns:a16="http://schemas.microsoft.com/office/drawing/2014/main" id="{CAB28D18-6EAA-D74C-8E5F-55601F0674AB}"/>
+              </a:ext>
+            </a:extLst>
+          </p:cNvPr>
+          <p:cNvSpPr txBox="1"/>
+          <p:nvPr/>
+        </p:nvSpPr>
+        <p:spPr>
+          <a:xfrm>
+            <a:off x="6012652" y="3282764"/>
             <a:ext cx="410690" cy="307777"/>
           </a:xfrm>
           <a:prstGeom prst="rect">

</xml_diff>

<commit_message>
address Sect. 3.3 comment from reviewer
</commit_message>
<xml_diff>
--- a/figs.pptx
+++ b/figs.pptx
@@ -259,7 +259,7 @@
           <a:p>
             <a:fld id="{6D4957DD-BE7F-EC43-9071-215F9B09617D}" type="datetimeFigureOut">
               <a:rPr lang="en-US" smtClean="0"/>
-              <a:t>2/23/21</a:t>
+              <a:t>6/16/21</a:t>
             </a:fld>
             <a:endParaRPr lang="en-US"/>
           </a:p>
@@ -457,7 +457,7 @@
           <a:p>
             <a:fld id="{6D4957DD-BE7F-EC43-9071-215F9B09617D}" type="datetimeFigureOut">
               <a:rPr lang="en-US" smtClean="0"/>
-              <a:t>2/23/21</a:t>
+              <a:t>6/16/21</a:t>
             </a:fld>
             <a:endParaRPr lang="en-US"/>
           </a:p>
@@ -665,7 +665,7 @@
           <a:p>
             <a:fld id="{6D4957DD-BE7F-EC43-9071-215F9B09617D}" type="datetimeFigureOut">
               <a:rPr lang="en-US" smtClean="0"/>
-              <a:t>2/23/21</a:t>
+              <a:t>6/16/21</a:t>
             </a:fld>
             <a:endParaRPr lang="en-US"/>
           </a:p>
@@ -863,7 +863,7 @@
           <a:p>
             <a:fld id="{6D4957DD-BE7F-EC43-9071-215F9B09617D}" type="datetimeFigureOut">
               <a:rPr lang="en-US" smtClean="0"/>
-              <a:t>2/23/21</a:t>
+              <a:t>6/16/21</a:t>
             </a:fld>
             <a:endParaRPr lang="en-US"/>
           </a:p>
@@ -1138,7 +1138,7 @@
           <a:p>
             <a:fld id="{6D4957DD-BE7F-EC43-9071-215F9B09617D}" type="datetimeFigureOut">
               <a:rPr lang="en-US" smtClean="0"/>
-              <a:t>2/23/21</a:t>
+              <a:t>6/16/21</a:t>
             </a:fld>
             <a:endParaRPr lang="en-US"/>
           </a:p>
@@ -1403,7 +1403,7 @@
           <a:p>
             <a:fld id="{6D4957DD-BE7F-EC43-9071-215F9B09617D}" type="datetimeFigureOut">
               <a:rPr lang="en-US" smtClean="0"/>
-              <a:t>2/23/21</a:t>
+              <a:t>6/16/21</a:t>
             </a:fld>
             <a:endParaRPr lang="en-US"/>
           </a:p>
@@ -1815,7 +1815,7 @@
           <a:p>
             <a:fld id="{6D4957DD-BE7F-EC43-9071-215F9B09617D}" type="datetimeFigureOut">
               <a:rPr lang="en-US" smtClean="0"/>
-              <a:t>2/23/21</a:t>
+              <a:t>6/16/21</a:t>
             </a:fld>
             <a:endParaRPr lang="en-US"/>
           </a:p>
@@ -1956,7 +1956,7 @@
           <a:p>
             <a:fld id="{6D4957DD-BE7F-EC43-9071-215F9B09617D}" type="datetimeFigureOut">
               <a:rPr lang="en-US" smtClean="0"/>
-              <a:t>2/23/21</a:t>
+              <a:t>6/16/21</a:t>
             </a:fld>
             <a:endParaRPr lang="en-US"/>
           </a:p>
@@ -2069,7 +2069,7 @@
           <a:p>
             <a:fld id="{6D4957DD-BE7F-EC43-9071-215F9B09617D}" type="datetimeFigureOut">
               <a:rPr lang="en-US" smtClean="0"/>
-              <a:t>2/23/21</a:t>
+              <a:t>6/16/21</a:t>
             </a:fld>
             <a:endParaRPr lang="en-US"/>
           </a:p>
@@ -2380,7 +2380,7 @@
           <a:p>
             <a:fld id="{6D4957DD-BE7F-EC43-9071-215F9B09617D}" type="datetimeFigureOut">
               <a:rPr lang="en-US" smtClean="0"/>
-              <a:t>2/23/21</a:t>
+              <a:t>6/16/21</a:t>
             </a:fld>
             <a:endParaRPr lang="en-US"/>
           </a:p>
@@ -2668,7 +2668,7 @@
           <a:p>
             <a:fld id="{6D4957DD-BE7F-EC43-9071-215F9B09617D}" type="datetimeFigureOut">
               <a:rPr lang="en-US" smtClean="0"/>
-              <a:t>2/23/21</a:t>
+              <a:t>6/16/21</a:t>
             </a:fld>
             <a:endParaRPr lang="en-US"/>
           </a:p>
@@ -2909,7 +2909,7 @@
           <a:p>
             <a:fld id="{6D4957DD-BE7F-EC43-9071-215F9B09617D}" type="datetimeFigureOut">
               <a:rPr lang="en-US" smtClean="0"/>
-              <a:t>2/23/21</a:t>
+              <a:t>6/16/21</a:t>
             </a:fld>
             <a:endParaRPr lang="en-US"/>
           </a:p>
@@ -3328,6 +3328,83 @@
       </p:grpSpPr>
       <p:sp>
         <p:nvSpPr>
+          <p:cNvPr id="42" name="TextBox 41">
+            <a:extLst>
+              <a:ext uri="{FF2B5EF4-FFF2-40B4-BE49-F238E27FC236}">
+                <a16:creationId xmlns:a16="http://schemas.microsoft.com/office/drawing/2014/main" id="{200F6A5C-1A70-EF43-A405-256B9E5D3148}"/>
+              </a:ext>
+            </a:extLst>
+          </p:cNvPr>
+          <p:cNvSpPr txBox="1"/>
+          <p:nvPr/>
+        </p:nvSpPr>
+        <p:spPr>
+          <a:xfrm>
+            <a:off x="6295794" y="2529978"/>
+            <a:ext cx="1011815" cy="307777"/>
+          </a:xfrm>
+          <a:prstGeom prst="rect">
+            <a:avLst/>
+          </a:prstGeom>
+          <a:solidFill>
+            <a:schemeClr val="bg2"/>
+          </a:solidFill>
+        </p:spPr>
+        <p:txBody>
+          <a:bodyPr wrap="none" rtlCol="0">
+            <a:spAutoFit/>
+          </a:bodyPr>
+          <a:lstStyle/>
+          <a:p>
+            <a:r>
+              <a:rPr lang="en-US" sz="1400" b="1" dirty="0"/>
+              <a:t>{&lt;{s, t}, e&gt;}</a:t>
+            </a:r>
+          </a:p>
+        </p:txBody>
+      </p:sp>
+      <p:sp>
+        <p:nvSpPr>
+          <p:cNvPr id="45" name="TextBox 44">
+            <a:extLst>
+              <a:ext uri="{FF2B5EF4-FFF2-40B4-BE49-F238E27FC236}">
+                <a16:creationId xmlns:a16="http://schemas.microsoft.com/office/drawing/2014/main" id="{0358960F-C5F6-4444-9464-8F89AF6ADAD8}"/>
+              </a:ext>
+            </a:extLst>
+          </p:cNvPr>
+          <p:cNvSpPr txBox="1"/>
+          <p:nvPr/>
+        </p:nvSpPr>
+        <p:spPr>
+          <a:xfrm>
+            <a:off x="4162338" y="3202188"/>
+            <a:ext cx="777777" cy="307777"/>
+          </a:xfrm>
+          <a:prstGeom prst="rect">
+            <a:avLst/>
+          </a:prstGeom>
+          <a:solidFill>
+            <a:schemeClr val="bg2"/>
+          </a:solidFill>
+          <a:ln>
+            <a:noFill/>
+          </a:ln>
+        </p:spPr>
+        <p:txBody>
+          <a:bodyPr wrap="none" rtlCol="0">
+            <a:spAutoFit/>
+          </a:bodyPr>
+          <a:lstStyle/>
+          <a:p>
+            <a:r>
+              <a:rPr lang="en-US" sz="1400" b="1" dirty="0"/>
+              <a:t>{&lt;∅, e&gt;}</a:t>
+            </a:r>
+          </a:p>
+        </p:txBody>
+      </p:sp>
+      <p:sp>
+        <p:nvSpPr>
           <p:cNvPr id="4" name="Oval 3">
             <a:extLst>
               <a:ext uri="{FF2B5EF4-FFF2-40B4-BE49-F238E27FC236}">
@@ -4044,76 +4121,6 @@
             <a:r>
               <a:rPr lang="en-US" sz="1400" b="1" dirty="0"/>
               <a:t>{&lt;{s}, e&gt;}</a:t>
-            </a:r>
-          </a:p>
-        </p:txBody>
-      </p:sp>
-      <p:sp>
-        <p:nvSpPr>
-          <p:cNvPr id="42" name="TextBox 41">
-            <a:extLst>
-              <a:ext uri="{FF2B5EF4-FFF2-40B4-BE49-F238E27FC236}">
-                <a16:creationId xmlns:a16="http://schemas.microsoft.com/office/drawing/2014/main" id="{200F6A5C-1A70-EF43-A405-256B9E5D3148}"/>
-              </a:ext>
-            </a:extLst>
-          </p:cNvPr>
-          <p:cNvSpPr txBox="1"/>
-          <p:nvPr/>
-        </p:nvSpPr>
-        <p:spPr>
-          <a:xfrm>
-            <a:off x="6256762" y="2563434"/>
-            <a:ext cx="1011815" cy="307777"/>
-          </a:xfrm>
-          <a:prstGeom prst="rect">
-            <a:avLst/>
-          </a:prstGeom>
-          <a:noFill/>
-        </p:spPr>
-        <p:txBody>
-          <a:bodyPr wrap="none" rtlCol="0">
-            <a:spAutoFit/>
-          </a:bodyPr>
-          <a:lstStyle/>
-          <a:p>
-            <a:r>
-              <a:rPr lang="en-US" sz="1400" b="1" dirty="0"/>
-              <a:t>{&lt;{s, t}, e&gt;}</a:t>
-            </a:r>
-          </a:p>
-        </p:txBody>
-      </p:sp>
-      <p:sp>
-        <p:nvSpPr>
-          <p:cNvPr id="45" name="TextBox 44">
-            <a:extLst>
-              <a:ext uri="{FF2B5EF4-FFF2-40B4-BE49-F238E27FC236}">
-                <a16:creationId xmlns:a16="http://schemas.microsoft.com/office/drawing/2014/main" id="{0358960F-C5F6-4444-9464-8F89AF6ADAD8}"/>
-              </a:ext>
-            </a:extLst>
-          </p:cNvPr>
-          <p:cNvSpPr txBox="1"/>
-          <p:nvPr/>
-        </p:nvSpPr>
-        <p:spPr>
-          <a:xfrm>
-            <a:off x="4273850" y="3213340"/>
-            <a:ext cx="1306191" cy="307777"/>
-          </a:xfrm>
-          <a:prstGeom prst="rect">
-            <a:avLst/>
-          </a:prstGeom>
-          <a:noFill/>
-        </p:spPr>
-        <p:txBody>
-          <a:bodyPr wrap="none" rtlCol="0">
-            <a:spAutoFit/>
-          </a:bodyPr>
-          <a:lstStyle/>
-          <a:p>
-            <a:r>
-              <a:rPr lang="en-US" sz="1400" b="1" dirty="0"/>
-              <a:t>{&lt;∅, e&gt;}</a:t>
             </a:r>
           </a:p>
         </p:txBody>

</xml_diff>